<commit_message>
Added example to story time
</commit_message>
<xml_diff>
--- a/02_True_False/LogicalRulesAndTactics.pptx
+++ b/02_True_False/LogicalRulesAndTactics.pptx
@@ -4839,52 +4839,150 @@
           </a:p>
         </p:txBody>
       </p:sp>
-      <p:sp>
-        <p:nvSpPr>
-          <p:cNvPr id="3" name="Content Placeholder 2">
-            <a:extLst>
-              <a:ext uri="{FF2B5EF4-FFF2-40B4-BE49-F238E27FC236}">
-                <a16:creationId xmlns:a16="http://schemas.microsoft.com/office/drawing/2014/main" id="{524DE286-F912-044F-B6FD-ACD4DB9EBB8A}"/>
-              </a:ext>
-            </a:extLst>
-          </p:cNvPr>
-          <p:cNvSpPr>
-            <a:spLocks noGrp="1"/>
-          </p:cNvSpPr>
-          <p:nvPr>
-            <p:ph idx="1"/>
-          </p:nvPr>
-        </p:nvSpPr>
-        <p:spPr/>
-        <p:txBody>
-          <a:bodyPr/>
-          <a:lstStyle/>
-          <a:p>
-            <a:r>
-              <a:rPr lang="en-US" dirty="0"/>
-              <a:t>In industrial applications, many provers allow you to build a large collection of “facts”</a:t>
-            </a:r>
-          </a:p>
-          <a:p>
-            <a:r>
-              <a:rPr lang="en-US" dirty="0"/>
-              <a:t>If one is not careful, these facts might contradict each other (this happens more often than you might expect)</a:t>
-            </a:r>
-          </a:p>
-          <a:p>
-            <a:r>
-              <a:rPr lang="en-US" dirty="0"/>
-              <a:t>How can we catch when we have introduced conflicting facts?</a:t>
-            </a:r>
-          </a:p>
-          <a:p>
-            <a:r>
-              <a:rPr lang="en-US" dirty="0"/>
-              <a:t>Solution: attempt to prove that false is true!</a:t>
-            </a:r>
-          </a:p>
-        </p:txBody>
-      </p:sp>
+      <mc:AlternateContent xmlns:mc="http://schemas.openxmlformats.org/markup-compatibility/2006">
+        <mc:Choice xmlns:a14="http://schemas.microsoft.com/office/drawing/2010/main" Requires="a14">
+          <p:sp>
+            <p:nvSpPr>
+              <p:cNvPr id="3" name="Content Placeholder 2">
+                <a:extLst>
+                  <a:ext uri="{FF2B5EF4-FFF2-40B4-BE49-F238E27FC236}">
+                    <a16:creationId xmlns:a16="http://schemas.microsoft.com/office/drawing/2014/main" id="{524DE286-F912-044F-B6FD-ACD4DB9EBB8A}"/>
+                  </a:ext>
+                </a:extLst>
+              </p:cNvPr>
+              <p:cNvSpPr>
+                <a:spLocks noGrp="1"/>
+              </p:cNvSpPr>
+              <p:nvPr>
+                <p:ph idx="1"/>
+              </p:nvPr>
+            </p:nvSpPr>
+            <p:spPr/>
+            <p:txBody>
+              <a:bodyPr/>
+              <a:lstStyle/>
+              <a:p>
+                <a:r>
+                  <a:rPr lang="en-US" dirty="0"/>
+                  <a:t>In industrial applications, many provers allow you to build a large collection of “facts”</a:t>
+                </a:r>
+              </a:p>
+              <a:p>
+                <a:r>
+                  <a:rPr lang="en-US" dirty="0"/>
+                  <a:t>If one is not careful, these facts might contradict each other (this happens more often than you might expect)</a:t>
+                </a:r>
+              </a:p>
+              <a:p>
+                <a:pPr lvl="1"/>
+                <a:r>
+                  <a:rPr lang="en-US" dirty="0"/>
+                  <a:t>Consider this </a:t>
+                </a:r>
+                <a:r>
+                  <a:rPr lang="en-US"/>
+                  <a:t>precondition actually used </a:t>
+                </a:r>
+                <a:r>
+                  <a:rPr lang="en-US" dirty="0"/>
+                  <a:t>to check that the magnitude of a number is greater than 1:</a:t>
+                </a:r>
+                <a:br>
+                  <a:rPr lang="en-US" dirty="0"/>
+                </a:br>
+                <a14:m>
+                  <m:oMath xmlns:m="http://schemas.openxmlformats.org/officeDocument/2006/math">
+                    <m:r>
+                      <a:rPr lang="en-US" b="0" i="0" smtClean="0">
+                        <a:latin typeface="Cambria Math" panose="02040503050406030204" pitchFamily="18" charset="0"/>
+                      </a:rPr>
+                      <m:t>(</m:t>
+                    </m:r>
+                    <m:r>
+                      <a:rPr lang="en-US" b="0" i="1" smtClean="0">
+                        <a:latin typeface="Cambria Math" panose="02040503050406030204" pitchFamily="18" charset="0"/>
+                      </a:rPr>
+                      <m:t>𝑥</m:t>
+                    </m:r>
+                    <m:r>
+                      <a:rPr lang="en-US" b="0" i="1" smtClean="0">
+                        <a:latin typeface="Cambria Math" panose="02040503050406030204" pitchFamily="18" charset="0"/>
+                      </a:rPr>
+                      <m:t>&lt;−1)⋀(</m:t>
+                    </m:r>
+                    <m:r>
+                      <a:rPr lang="en-US" b="0" i="1" smtClean="0">
+                        <a:latin typeface="Cambria Math" panose="02040503050406030204" pitchFamily="18" charset="0"/>
+                        <a:ea typeface="Cambria Math" panose="02040503050406030204" pitchFamily="18" charset="0"/>
+                      </a:rPr>
+                      <m:t>𝑥</m:t>
+                    </m:r>
+                    <m:r>
+                      <a:rPr lang="en-US" b="0" i="1" smtClean="0">
+                        <a:latin typeface="Cambria Math" panose="02040503050406030204" pitchFamily="18" charset="0"/>
+                        <a:ea typeface="Cambria Math" panose="02040503050406030204" pitchFamily="18" charset="0"/>
+                      </a:rPr>
+                      <m:t>&gt;1)</m:t>
+                    </m:r>
+                  </m:oMath>
+                </a14:m>
+                <a:endParaRPr lang="en-US" dirty="0"/>
+              </a:p>
+              <a:p>
+                <a:r>
+                  <a:rPr lang="en-US" dirty="0"/>
+                  <a:t>How can we catch when we have introduced conflicting facts?</a:t>
+                </a:r>
+              </a:p>
+              <a:p>
+                <a:r>
+                  <a:rPr lang="en-US" dirty="0"/>
+                  <a:t>Solution: attempt to prove that false is true!</a:t>
+                </a:r>
+              </a:p>
+            </p:txBody>
+          </p:sp>
+        </mc:Choice>
+        <mc:Fallback>
+          <p:sp>
+            <p:nvSpPr>
+              <p:cNvPr id="3" name="Content Placeholder 2">
+                <a:extLst>
+                  <a:ext uri="{FF2B5EF4-FFF2-40B4-BE49-F238E27FC236}">
+                    <a16:creationId xmlns:a16="http://schemas.microsoft.com/office/drawing/2014/main" id="{524DE286-F912-044F-B6FD-ACD4DB9EBB8A}"/>
+                  </a:ext>
+                </a:extLst>
+              </p:cNvPr>
+              <p:cNvSpPr>
+                <a:spLocks noGrp="1" noRot="1" noChangeAspect="1" noMove="1" noResize="1" noEditPoints="1" noAdjustHandles="1" noChangeArrowheads="1" noChangeShapeType="1" noTextEdit="1"/>
+              </p:cNvSpPr>
+              <p:nvPr>
+                <p:ph idx="1"/>
+              </p:nvPr>
+            </p:nvSpPr>
+            <p:spPr>
+              <a:blipFill>
+                <a:blip r:embed="rId2"/>
+                <a:stretch>
+                  <a:fillRect l="-965" t="-2632"/>
+                </a:stretch>
+              </a:blipFill>
+            </p:spPr>
+            <p:txBody>
+              <a:bodyPr/>
+              <a:lstStyle/>
+              <a:p>
+                <a:r>
+                  <a:rPr lang="en-US">
+                    <a:noFill/>
+                  </a:rPr>
+                  <a:t> </a:t>
+                </a:r>
+              </a:p>
+            </p:txBody>
+          </p:sp>
+        </mc:Fallback>
+      </mc:AlternateContent>
     </p:spTree>
     <p:extLst>
       <p:ext uri="{BB962C8B-B14F-4D97-AF65-F5344CB8AC3E}">
@@ -4895,85 +4993,6 @@
   <p:clrMapOvr>
     <a:masterClrMapping/>
   </p:clrMapOvr>
-  <p:timing>
-    <p:tnLst>
-      <p:par>
-        <p:cTn id="1" dur="indefinite" restart="never" nodeType="tmRoot">
-          <p:childTnLst>
-            <p:seq concurrent="1" nextAc="seek">
-              <p:cTn id="2" dur="indefinite" nodeType="mainSeq">
-                <p:childTnLst>
-                  <p:par>
-                    <p:cTn id="3" fill="hold">
-                      <p:stCondLst>
-                        <p:cond delay="indefinite"/>
-                      </p:stCondLst>
-                      <p:childTnLst>
-                        <p:par>
-                          <p:cTn id="4" fill="hold">
-                            <p:stCondLst>
-                              <p:cond delay="0"/>
-                            </p:stCondLst>
-                            <p:childTnLst>
-                              <p:par>
-                                <p:cTn id="5" presetID="1" presetClass="entr" presetSubtype="0" fill="hold" nodeType="clickEffect">
-                                  <p:stCondLst>
-                                    <p:cond delay="0"/>
-                                  </p:stCondLst>
-                                  <p:childTnLst>
-                                    <p:set>
-                                      <p:cBhvr>
-                                        <p:cTn id="6" dur="1" fill="hold">
-                                          <p:stCondLst>
-                                            <p:cond delay="0"/>
-                                          </p:stCondLst>
-                                        </p:cTn>
-                                        <p:tgtEl>
-                                          <p:spTgt spid="3">
-                                            <p:txEl>
-                                              <p:pRg st="3" end="3"/>
-                                            </p:txEl>
-                                          </p:spTgt>
-                                        </p:tgtEl>
-                                        <p:attrNameLst>
-                                          <p:attrName>style.visibility</p:attrName>
-                                        </p:attrNameLst>
-                                      </p:cBhvr>
-                                      <p:to>
-                                        <p:strVal val="visible"/>
-                                      </p:to>
-                                    </p:set>
-                                  </p:childTnLst>
-                                </p:cTn>
-                              </p:par>
-                            </p:childTnLst>
-                          </p:cTn>
-                        </p:par>
-                      </p:childTnLst>
-                    </p:cTn>
-                  </p:par>
-                </p:childTnLst>
-              </p:cTn>
-              <p:prevCondLst>
-                <p:cond evt="onPrev" delay="0">
-                  <p:tgtEl>
-                    <p:sldTgt/>
-                  </p:tgtEl>
-                </p:cond>
-              </p:prevCondLst>
-              <p:nextCondLst>
-                <p:cond evt="onNext" delay="0">
-                  <p:tgtEl>
-                    <p:sldTgt/>
-                  </p:tgtEl>
-                </p:cond>
-              </p:nextCondLst>
-            </p:seq>
-          </p:childTnLst>
-        </p:cTn>
-      </p:par>
-    </p:tnLst>
-  </p:timing>
 </p:sld>
 </file>
 

</xml_diff>

<commit_message>
Tweaked wording in example
</commit_message>
<xml_diff>
--- a/02_True_False/LogicalRulesAndTactics.pptx
+++ b/02_True_False/LogicalRulesAndTactics.pptx
@@ -4877,15 +4877,15 @@
                 <a:pPr lvl="1"/>
                 <a:r>
                   <a:rPr lang="en-US" dirty="0"/>
-                  <a:t>Consider this </a:t>
+                  <a:t>Consider </a:t>
                 </a:r>
                 <a:r>
                   <a:rPr lang="en-US"/>
-                  <a:t>precondition actually used </a:t>
+                  <a:t>this antecedent </a:t>
                 </a:r>
                 <a:r>
                   <a:rPr lang="en-US" dirty="0"/>
-                  <a:t>to check that the magnitude of a number is greater than 1:</a:t>
+                  <a:t>actually used to check that the magnitude of a number is greater than 1:</a:t>
                 </a:r>
                 <a:br>
                   <a:rPr lang="en-US" dirty="0"/>

</xml_diff>